<commit_message>
added missing video link
</commit_message>
<xml_diff>
--- a/Presentation.pptx
+++ b/Presentation.pptx
@@ -134,19 +134,19 @@
 <pc:chgInfo xmlns:a="http://schemas.openxmlformats.org/drawingml/2006/main" xmlns:r="http://schemas.openxmlformats.org/officeDocument/2006/relationships" xmlns:ac="http://schemas.microsoft.com/office/drawing/2013/main/command" xmlns:pc="http://schemas.microsoft.com/office/powerpoint/2013/main/command">
   <pc:docChgLst>
     <pc:chgData name="James M" userId="5854db7b9d972701" providerId="LiveId" clId="{2F25CF6A-4328-49C9-84C0-2E371C84F08F}"/>
-    <pc:docChg chg="modSld">
-      <pc:chgData name="James M" userId="5854db7b9d972701" providerId="LiveId" clId="{2F25CF6A-4328-49C9-84C0-2E371C84F08F}" dt="2022-04-08T12:51:35.701" v="75" actId="20577"/>
+    <pc:docChg chg="undo custSel modSld">
+      <pc:chgData name="James M" userId="5854db7b9d972701" providerId="LiveId" clId="{2F25CF6A-4328-49C9-84C0-2E371C84F08F}" dt="2022-04-08T12:57:56.624" v="112"/>
       <pc:docMkLst>
         <pc:docMk/>
       </pc:docMkLst>
       <pc:sldChg chg="modSp mod">
-        <pc:chgData name="James M" userId="5854db7b9d972701" providerId="LiveId" clId="{2F25CF6A-4328-49C9-84C0-2E371C84F08F}" dt="2022-04-08T12:51:35.701" v="75" actId="20577"/>
+        <pc:chgData name="James M" userId="5854db7b9d972701" providerId="LiveId" clId="{2F25CF6A-4328-49C9-84C0-2E371C84F08F}" dt="2022-04-08T12:57:56.624" v="112"/>
         <pc:sldMkLst>
           <pc:docMk/>
           <pc:sldMk cId="940058233" sldId="264"/>
         </pc:sldMkLst>
         <pc:spChg chg="mod">
-          <ac:chgData name="James M" userId="5854db7b9d972701" providerId="LiveId" clId="{2F25CF6A-4328-49C9-84C0-2E371C84F08F}" dt="2022-04-08T12:51:35.701" v="75" actId="20577"/>
+          <ac:chgData name="James M" userId="5854db7b9d972701" providerId="LiveId" clId="{2F25CF6A-4328-49C9-84C0-2E371C84F08F}" dt="2022-04-08T12:57:56.624" v="112"/>
           <ac:spMkLst>
             <pc:docMk/>
             <pc:sldMk cId="940058233" sldId="264"/>
@@ -254,7 +254,7 @@
           <a:effectLst/>
           <a:extLst>
             <a:ext uri="{91240B29-F687-4f45-9708-019B960494DF}">
-              <a14:hiddenLine xmlns="" xmlns:a14="http://schemas.microsoft.com/office/drawing/2010/main" w="9525">
+              <a14:hiddenLine xmlns:a14="http://schemas.microsoft.com/office/drawing/2010/main" xmlns="" w="9525">
                 <a:solidFill>
                   <a:srgbClr val="000000"/>
                 </a:solidFill>
@@ -444,7 +444,7 @@
           <a:p>
             <a:fld id="{9826BB93-E951-43DF-B38D-73F04CF3BD15}" type="datetimeFigureOut">
               <a:rPr lang="en-GB" smtClean="0"/>
-              <a:t>06/04/2022</a:t>
+              <a:t>08/04/2022</a:t>
             </a:fld>
             <a:endParaRPr lang="en-GB"/>
           </a:p>
@@ -760,7 +760,7 @@
           <a:p>
             <a:fld id="{9826BB93-E951-43DF-B38D-73F04CF3BD15}" type="datetimeFigureOut">
               <a:rPr lang="en-GB" smtClean="0"/>
-              <a:t>06/04/2022</a:t>
+              <a:t>08/04/2022</a:t>
             </a:fld>
             <a:endParaRPr lang="en-GB"/>
           </a:p>
@@ -1247,7 +1247,7 @@
           <a:p>
             <a:fld id="{9826BB93-E951-43DF-B38D-73F04CF3BD15}" type="datetimeFigureOut">
               <a:rPr lang="en-GB" smtClean="0"/>
-              <a:t>06/04/2022</a:t>
+              <a:t>08/04/2022</a:t>
             </a:fld>
             <a:endParaRPr lang="en-GB"/>
           </a:p>
@@ -1615,7 +1615,7 @@
           <a:p>
             <a:fld id="{9826BB93-E951-43DF-B38D-73F04CF3BD15}" type="datetimeFigureOut">
               <a:rPr lang="en-GB" smtClean="0"/>
-              <a:t>06/04/2022</a:t>
+              <a:t>08/04/2022</a:t>
             </a:fld>
             <a:endParaRPr lang="en-GB"/>
           </a:p>
@@ -1770,7 +1770,7 @@
           <a:ln/>
           <a:extLst>
             <a:ext uri="{91240B29-F687-4f45-9708-019B960494DF}">
-              <a14:hiddenLine xmlns="" xmlns:a14="http://schemas.microsoft.com/office/drawing/2010/main" w="9525">
+              <a14:hiddenLine xmlns:a14="http://schemas.microsoft.com/office/drawing/2010/main" xmlns="" w="9525">
                 <a:solidFill>
                   <a:srgbClr val="000000"/>
                 </a:solidFill>
@@ -1886,7 +1886,7 @@
           <a:p>
             <a:fld id="{9826BB93-E951-43DF-B38D-73F04CF3BD15}" type="datetimeFigureOut">
               <a:rPr lang="en-GB" smtClean="0"/>
-              <a:t>06/04/2022</a:t>
+              <a:t>08/04/2022</a:t>
             </a:fld>
             <a:endParaRPr lang="en-GB"/>
           </a:p>
@@ -2043,7 +2043,7 @@
           <a:ln/>
           <a:extLst>
             <a:ext uri="{91240B29-F687-4f45-9708-019B960494DF}">
-              <a14:hiddenLine xmlns="" xmlns:a14="http://schemas.microsoft.com/office/drawing/2010/main" w="9525">
+              <a14:hiddenLine xmlns:a14="http://schemas.microsoft.com/office/drawing/2010/main" xmlns="" w="9525">
                 <a:solidFill>
                   <a:srgbClr val="000000"/>
                 </a:solidFill>
@@ -2169,7 +2169,7 @@
           <a:p>
             <a:fld id="{9826BB93-E951-43DF-B38D-73F04CF3BD15}" type="datetimeFigureOut">
               <a:rPr lang="en-GB" smtClean="0"/>
-              <a:t>06/04/2022</a:t>
+              <a:t>08/04/2022</a:t>
             </a:fld>
             <a:endParaRPr lang="en-GB"/>
           </a:p>
@@ -2324,7 +2324,7 @@
           <a:ln/>
           <a:extLst>
             <a:ext uri="{91240B29-F687-4f45-9708-019B960494DF}">
-              <a14:hiddenLine xmlns="" xmlns:a14="http://schemas.microsoft.com/office/drawing/2010/main" w="9525">
+              <a14:hiddenLine xmlns:a14="http://schemas.microsoft.com/office/drawing/2010/main" xmlns="" w="9525">
                 <a:solidFill>
                   <a:srgbClr val="000000"/>
                 </a:solidFill>
@@ -2450,7 +2450,7 @@
           <a:p>
             <a:fld id="{9826BB93-E951-43DF-B38D-73F04CF3BD15}" type="datetimeFigureOut">
               <a:rPr lang="en-GB" smtClean="0"/>
-              <a:t>06/04/2022</a:t>
+              <a:t>08/04/2022</a:t>
             </a:fld>
             <a:endParaRPr lang="en-GB"/>
           </a:p>
@@ -2792,7 +2792,7 @@
           <a:p>
             <a:fld id="{9826BB93-E951-43DF-B38D-73F04CF3BD15}" type="datetimeFigureOut">
               <a:rPr lang="en-GB" smtClean="0"/>
-              <a:t>06/04/2022</a:t>
+              <a:t>08/04/2022</a:t>
             </a:fld>
             <a:endParaRPr lang="en-GB"/>
           </a:p>
@@ -2947,7 +2947,7 @@
           <a:ln/>
           <a:extLst>
             <a:ext uri="{91240B29-F687-4f45-9708-019B960494DF}">
-              <a14:hiddenLine xmlns="" xmlns:a14="http://schemas.microsoft.com/office/drawing/2010/main" w="9525">
+              <a14:hiddenLine xmlns:a14="http://schemas.microsoft.com/office/drawing/2010/main" xmlns="" w="9525">
                 <a:solidFill>
                   <a:srgbClr val="000000"/>
                 </a:solidFill>
@@ -3128,7 +3128,7 @@
           <a:p>
             <a:fld id="{9826BB93-E951-43DF-B38D-73F04CF3BD15}" type="datetimeFigureOut">
               <a:rPr lang="en-GB" smtClean="0"/>
-              <a:t>06/04/2022</a:t>
+              <a:t>08/04/2022</a:t>
             </a:fld>
             <a:endParaRPr lang="en-GB"/>
           </a:p>
@@ -3283,7 +3283,7 @@
           <a:ln/>
           <a:extLst>
             <a:ext uri="{91240B29-F687-4f45-9708-019B960494DF}">
-              <a14:hiddenLine xmlns="" xmlns:a14="http://schemas.microsoft.com/office/drawing/2010/main" w="9525">
+              <a14:hiddenLine xmlns:a14="http://schemas.microsoft.com/office/drawing/2010/main" xmlns="" w="9525">
                 <a:solidFill>
                   <a:srgbClr val="000000"/>
                 </a:solidFill>
@@ -3602,7 +3602,7 @@
           <a:p>
             <a:fld id="{9826BB93-E951-43DF-B38D-73F04CF3BD15}" type="datetimeFigureOut">
               <a:rPr lang="en-GB" smtClean="0"/>
-              <a:t>06/04/2022</a:t>
+              <a:t>08/04/2022</a:t>
             </a:fld>
             <a:endParaRPr lang="en-GB"/>
           </a:p>
@@ -3757,7 +3757,7 @@
           <a:ln/>
           <a:extLst>
             <a:ext uri="{91240B29-F687-4f45-9708-019B960494DF}">
-              <a14:hiddenLine xmlns="" xmlns:a14="http://schemas.microsoft.com/office/drawing/2010/main" w="9525">
+              <a14:hiddenLine xmlns:a14="http://schemas.microsoft.com/office/drawing/2010/main" xmlns="" w="9525">
                 <a:solidFill>
                   <a:srgbClr val="000000"/>
                 </a:solidFill>
@@ -3822,7 +3822,7 @@
           <a:p>
             <a:fld id="{9826BB93-E951-43DF-B38D-73F04CF3BD15}" type="datetimeFigureOut">
               <a:rPr lang="en-GB" smtClean="0"/>
-              <a:t>06/04/2022</a:t>
+              <a:t>08/04/2022</a:t>
             </a:fld>
             <a:endParaRPr lang="en-GB"/>
           </a:p>
@@ -3917,7 +3917,7 @@
           <a:p>
             <a:fld id="{9826BB93-E951-43DF-B38D-73F04CF3BD15}" type="datetimeFigureOut">
               <a:rPr lang="en-GB" smtClean="0"/>
-              <a:t>06/04/2022</a:t>
+              <a:t>08/04/2022</a:t>
             </a:fld>
             <a:endParaRPr lang="en-GB"/>
           </a:p>
@@ -4185,7 +4185,7 @@
           <a:ln/>
           <a:extLst>
             <a:ext uri="{91240B29-F687-4f45-9708-019B960494DF}">
-              <a14:hiddenLine xmlns="" xmlns:a14="http://schemas.microsoft.com/office/drawing/2010/main" w="9525">
+              <a14:hiddenLine xmlns:a14="http://schemas.microsoft.com/office/drawing/2010/main" xmlns="" w="9525">
                 <a:solidFill>
                   <a:srgbClr val="000000"/>
                 </a:solidFill>
@@ -4382,7 +4382,7 @@
           <a:p>
             <a:fld id="{9826BB93-E951-43DF-B38D-73F04CF3BD15}" type="datetimeFigureOut">
               <a:rPr lang="en-GB" smtClean="0"/>
-              <a:t>06/04/2022</a:t>
+              <a:t>08/04/2022</a:t>
             </a:fld>
             <a:endParaRPr lang="en-GB"/>
           </a:p>
@@ -4693,7 +4693,7 @@
           <a:p>
             <a:fld id="{9826BB93-E951-43DF-B38D-73F04CF3BD15}" type="datetimeFigureOut">
               <a:rPr lang="en-GB" smtClean="0"/>
-              <a:t>06/04/2022</a:t>
+              <a:t>08/04/2022</a:t>
             </a:fld>
             <a:endParaRPr lang="en-GB"/>
           </a:p>
@@ -4961,7 +4961,7 @@
           <a:p>
             <a:fld id="{9826BB93-E951-43DF-B38D-73F04CF3BD15}" type="datetimeFigureOut">
               <a:rPr lang="en-GB" smtClean="0"/>
-              <a:t>06/04/2022</a:t>
+              <a:t>08/04/2022</a:t>
             </a:fld>
             <a:endParaRPr lang="en-GB"/>
           </a:p>
@@ -6771,11 +6771,20 @@
             </a:r>
             <a:r>
               <a:rPr lang="en-GB" dirty="0"/>
-              <a:t> </a:t>
+              <a:t> (free to use)</a:t>
+            </a:r>
+          </a:p>
+          <a:p>
+            <a:pPr marL="0" indent="0">
+              <a:buNone/>
+            </a:pPr>
+            <a:r>
+              <a:rPr lang="en-GB" dirty="0"/>
+              <a:t>Landing screen video</a:t>
             </a:r>
             <a:r>
               <a:rPr lang="en-GB"/>
-              <a:t>(free to use)</a:t>
+              <a:t>: https://www.pexels.com/video/lighted-candle-855262/</a:t>
             </a:r>
             <a:endParaRPr lang="en-GB" dirty="0"/>
           </a:p>

</xml_diff>